<commit_message>
Small verbiage change in scaffolding slide
</commit_message>
<xml_diff>
--- a/Getting Started with ASP.NET 5 in VS Code.pptx
+++ b/Getting Started with ASP.NET 5 in VS Code.pptx
@@ -15872,11 +15872,15 @@
           <a:p>
             <a:r>
               <a:rPr lang="en-US" dirty="0" smtClean="0"/>
-              <a:t>Scaffolding Support </a:t>
+              <a:t>Scaffolding </a:t>
+            </a:r>
+            <a:r>
+              <a:rPr lang="en-US" smtClean="0"/>
+              <a:t>Support for </a:t>
             </a:r>
             <a:r>
               <a:rPr lang="en-US" dirty="0" smtClean="0"/>
-              <a:t>in VS Code</a:t>
+              <a:t>VS Code</a:t>
             </a:r>
             <a:endParaRPr lang="en-US" dirty="0"/>
           </a:p>

</xml_diff>

<commit_message>
Added link for DN* tooling installation
</commit_message>
<xml_diff>
--- a/Getting Started with ASP.NET 5 in VS Code.pptx
+++ b/Getting Started with ASP.NET 5 in VS Code.pptx
@@ -127,7 +127,7 @@
   </p:defaultTextStyle>
   <p:extLst>
     <p:ext uri="{EFAFB233-063F-42B5-8137-9DF3F51BA10A}">
-      <p15:sldGuideLst xmlns:p15="http://schemas.microsoft.com/office/powerpoint/2012/main">
+      <p15:sldGuideLst xmlns="" xmlns:p15="http://schemas.microsoft.com/office/powerpoint/2012/main">
         <p15:guide id="1" orient="horz" pos="2160" userDrawn="1">
           <p15:clr>
             <a:srgbClr val="A4A3A4"/>
@@ -1841,6 +1841,13 @@
         </dgm:presLayoutVars>
       </dgm:prSet>
       <dgm:spPr/>
+      <dgm:t>
+        <a:bodyPr/>
+        <a:lstStyle/>
+        <a:p>
+          <a:endParaRPr lang="en-US"/>
+        </a:p>
+      </dgm:t>
     </dgm:pt>
     <dgm:pt modelId="{0DA0A989-CBED-4B19-A3FE-81EAF897B5B7}" type="pres">
       <dgm:prSet presAssocID="{48C133C3-77F3-4A71-8515-4B7725FB695C}" presName="hierRoot1" presStyleCnt="0">
@@ -1862,6 +1869,13 @@
         </dgm:presLayoutVars>
       </dgm:prSet>
       <dgm:spPr/>
+      <dgm:t>
+        <a:bodyPr/>
+        <a:lstStyle/>
+        <a:p>
+          <a:endParaRPr lang="en-US"/>
+        </a:p>
+      </dgm:t>
     </dgm:pt>
     <dgm:pt modelId="{EFFCA47C-D5C2-4308-A844-2CC7B5C9555D}" type="pres">
       <dgm:prSet presAssocID="{48C133C3-77F3-4A71-8515-4B7725FB695C}" presName="titleText1" presStyleLbl="fgAcc0" presStyleIdx="0" presStyleCnt="1" custScaleX="279711" custLinFactNeighborX="-7515" custLinFactNeighborY="95890">
@@ -1871,10 +1885,24 @@
         </dgm:presLayoutVars>
       </dgm:prSet>
       <dgm:spPr/>
+      <dgm:t>
+        <a:bodyPr/>
+        <a:lstStyle/>
+        <a:p>
+          <a:endParaRPr lang="en-US"/>
+        </a:p>
+      </dgm:t>
     </dgm:pt>
     <dgm:pt modelId="{E4683AE9-12A6-4E1D-8807-2134BE840AFA}" type="pres">
       <dgm:prSet presAssocID="{48C133C3-77F3-4A71-8515-4B7725FB695C}" presName="rootConnector1" presStyleLbl="node1" presStyleIdx="0" presStyleCnt="3"/>
       <dgm:spPr/>
+      <dgm:t>
+        <a:bodyPr/>
+        <a:lstStyle/>
+        <a:p>
+          <a:endParaRPr lang="en-US"/>
+        </a:p>
+      </dgm:t>
     </dgm:pt>
     <dgm:pt modelId="{E266A8FF-97C8-4138-9197-7BCA3AB036B3}" type="pres">
       <dgm:prSet presAssocID="{48C133C3-77F3-4A71-8515-4B7725FB695C}" presName="hierChild2" presStyleCnt="0"/>
@@ -1883,6 +1911,13 @@
     <dgm:pt modelId="{6C4D6CE3-4FAA-4D39-8A22-7BAC7C27FEEC}" type="pres">
       <dgm:prSet presAssocID="{523E3F81-A7FD-41C6-AEFA-00BFD2D5C126}" presName="Name37" presStyleLbl="parChTrans1D2" presStyleIdx="0" presStyleCnt="3"/>
       <dgm:spPr/>
+      <dgm:t>
+        <a:bodyPr/>
+        <a:lstStyle/>
+        <a:p>
+          <a:endParaRPr lang="en-US"/>
+        </a:p>
+      </dgm:t>
     </dgm:pt>
     <dgm:pt modelId="{1FD04404-7F57-4E0A-96B8-2299288FE726}" type="pres">
       <dgm:prSet presAssocID="{6C56C7E1-118B-466E-A84D-657D222A3EFB}" presName="hierRoot2" presStyleCnt="0">
@@ -1904,6 +1939,13 @@
         </dgm:presLayoutVars>
       </dgm:prSet>
       <dgm:spPr/>
+      <dgm:t>
+        <a:bodyPr/>
+        <a:lstStyle/>
+        <a:p>
+          <a:endParaRPr lang="en-US"/>
+        </a:p>
+      </dgm:t>
     </dgm:pt>
     <dgm:pt modelId="{40DF6143-7A1D-4CBC-A39F-187E0F34DDEB}" type="pres">
       <dgm:prSet presAssocID="{6C56C7E1-118B-466E-A84D-657D222A3EFB}" presName="titleText2" presStyleLbl="fgAcc1" presStyleIdx="0" presStyleCnt="3">
@@ -1924,6 +1966,13 @@
     <dgm:pt modelId="{443F2EA8-12E1-4F9D-B8E2-9D66197C9EA8}" type="pres">
       <dgm:prSet presAssocID="{6C56C7E1-118B-466E-A84D-657D222A3EFB}" presName="rootConnector" presStyleLbl="node2" presStyleIdx="0" presStyleCnt="0"/>
       <dgm:spPr/>
+      <dgm:t>
+        <a:bodyPr/>
+        <a:lstStyle/>
+        <a:p>
+          <a:endParaRPr lang="en-US"/>
+        </a:p>
+      </dgm:t>
     </dgm:pt>
     <dgm:pt modelId="{D5FA2318-57AC-41A7-B7B1-2298A7F5EF08}" type="pres">
       <dgm:prSet presAssocID="{6C56C7E1-118B-466E-A84D-657D222A3EFB}" presName="hierChild4" presStyleCnt="0"/>
@@ -1936,6 +1985,13 @@
     <dgm:pt modelId="{8D96E3EE-4EE6-47C0-BDA3-1B464380816D}" type="pres">
       <dgm:prSet presAssocID="{4EEC8717-AA0F-49DE-8732-2508B3115DE0}" presName="Name37" presStyleLbl="parChTrans1D2" presStyleIdx="1" presStyleCnt="3"/>
       <dgm:spPr/>
+      <dgm:t>
+        <a:bodyPr/>
+        <a:lstStyle/>
+        <a:p>
+          <a:endParaRPr lang="en-US"/>
+        </a:p>
+      </dgm:t>
     </dgm:pt>
     <dgm:pt modelId="{44CA2DCF-42C0-407A-ABE2-B3D41E866CEB}" type="pres">
       <dgm:prSet presAssocID="{B4FA02E4-55C6-4E7F-89E1-A36E659C009D}" presName="hierRoot2" presStyleCnt="0">
@@ -1957,6 +2013,13 @@
         </dgm:presLayoutVars>
       </dgm:prSet>
       <dgm:spPr/>
+      <dgm:t>
+        <a:bodyPr/>
+        <a:lstStyle/>
+        <a:p>
+          <a:endParaRPr lang="en-US"/>
+        </a:p>
+      </dgm:t>
     </dgm:pt>
     <dgm:pt modelId="{8C87CF99-C695-483F-877F-16140EF7B842}" type="pres">
       <dgm:prSet presAssocID="{B4FA02E4-55C6-4E7F-89E1-A36E659C009D}" presName="titleText2" presStyleLbl="fgAcc1" presStyleIdx="1" presStyleCnt="3">
@@ -1977,6 +2040,13 @@
     <dgm:pt modelId="{6A000DF7-1A06-4720-A08C-779CAA7DF395}" type="pres">
       <dgm:prSet presAssocID="{B4FA02E4-55C6-4E7F-89E1-A36E659C009D}" presName="rootConnector" presStyleLbl="node2" presStyleIdx="0" presStyleCnt="0"/>
       <dgm:spPr/>
+      <dgm:t>
+        <a:bodyPr/>
+        <a:lstStyle/>
+        <a:p>
+          <a:endParaRPr lang="en-US"/>
+        </a:p>
+      </dgm:t>
     </dgm:pt>
     <dgm:pt modelId="{DABA6A64-3116-429A-A6C2-E81A683FF019}" type="pres">
       <dgm:prSet presAssocID="{B4FA02E4-55C6-4E7F-89E1-A36E659C009D}" presName="hierChild4" presStyleCnt="0"/>
@@ -1989,6 +2059,13 @@
     <dgm:pt modelId="{3E8CF59A-FAAD-44AA-979D-BA7D6881B96A}" type="pres">
       <dgm:prSet presAssocID="{CEA44938-41CA-4FE2-8E9C-87D351F742D9}" presName="Name37" presStyleLbl="parChTrans1D2" presStyleIdx="2" presStyleCnt="3"/>
       <dgm:spPr/>
+      <dgm:t>
+        <a:bodyPr/>
+        <a:lstStyle/>
+        <a:p>
+          <a:endParaRPr lang="en-US"/>
+        </a:p>
+      </dgm:t>
     </dgm:pt>
     <dgm:pt modelId="{C1633CCD-9047-4C60-92A6-ABE37F20362C}" type="pres">
       <dgm:prSet presAssocID="{98676505-2196-4383-BEFB-5F6FF8DFC4F3}" presName="hierRoot2" presStyleCnt="0">
@@ -2010,6 +2087,13 @@
         </dgm:presLayoutVars>
       </dgm:prSet>
       <dgm:spPr/>
+      <dgm:t>
+        <a:bodyPr/>
+        <a:lstStyle/>
+        <a:p>
+          <a:endParaRPr lang="en-US"/>
+        </a:p>
+      </dgm:t>
     </dgm:pt>
     <dgm:pt modelId="{511293F5-5A5E-445C-B435-92C4CB8E9AD6}" type="pres">
       <dgm:prSet presAssocID="{98676505-2196-4383-BEFB-5F6FF8DFC4F3}" presName="titleText2" presStyleLbl="fgAcc1" presStyleIdx="2" presStyleCnt="3">
@@ -2030,6 +2114,13 @@
     <dgm:pt modelId="{00BA90B6-26AF-4594-9663-43A9B290A14C}" type="pres">
       <dgm:prSet presAssocID="{98676505-2196-4383-BEFB-5F6FF8DFC4F3}" presName="rootConnector" presStyleLbl="node2" presStyleIdx="0" presStyleCnt="0"/>
       <dgm:spPr/>
+      <dgm:t>
+        <a:bodyPr/>
+        <a:lstStyle/>
+        <a:p>
+          <a:endParaRPr lang="en-US"/>
+        </a:p>
+      </dgm:t>
     </dgm:pt>
     <dgm:pt modelId="{392062C4-C553-41FE-8178-6B977942723D}" type="pres">
       <dgm:prSet presAssocID="{98676505-2196-4383-BEFB-5F6FF8DFC4F3}" presName="hierChild4" presStyleCnt="0"/>
@@ -2045,26 +2136,26 @@
     </dgm:pt>
   </dgm:ptLst>
   <dgm:cxnLst>
+    <dgm:cxn modelId="{7099AADB-E474-47E6-AA7C-4BD0C5FC6EE1}" type="presOf" srcId="{56F91B86-C79C-443A-89FC-288C3CB26305}" destId="{BF944616-80E6-4E36-ADDD-11AD911A0320}" srcOrd="0" destOrd="0" presId="urn:microsoft.com/office/officeart/2008/layout/NameandTitleOrganizationalChart"/>
+    <dgm:cxn modelId="{9B636C39-7CFA-40B2-8376-6FC260A550B2}" type="presOf" srcId="{4EEC8717-AA0F-49DE-8732-2508B3115DE0}" destId="{8D96E3EE-4EE6-47C0-BDA3-1B464380816D}" srcOrd="0" destOrd="0" presId="urn:microsoft.com/office/officeart/2008/layout/NameandTitleOrganizationalChart"/>
+    <dgm:cxn modelId="{CF846937-B19A-4065-B834-FC7D5A653E4B}" type="presOf" srcId="{6C56C7E1-118B-466E-A84D-657D222A3EFB}" destId="{443F2EA8-12E1-4F9D-B8E2-9D66197C9EA8}" srcOrd="1" destOrd="0" presId="urn:microsoft.com/office/officeart/2008/layout/NameandTitleOrganizationalChart"/>
+    <dgm:cxn modelId="{650D092C-E41D-4A25-B57D-FD16FCFF412B}" type="presOf" srcId="{6C56C7E1-118B-466E-A84D-657D222A3EFB}" destId="{B2077D14-C7CA-4B09-B173-BEA41D78B926}" srcOrd="0" destOrd="0" presId="urn:microsoft.com/office/officeart/2008/layout/NameandTitleOrganizationalChart"/>
+    <dgm:cxn modelId="{C477F7AD-84AD-48A4-AA50-BC2C18AF229C}" type="presOf" srcId="{98676505-2196-4383-BEFB-5F6FF8DFC4F3}" destId="{00BA90B6-26AF-4594-9663-43A9B290A14C}" srcOrd="1" destOrd="0" presId="urn:microsoft.com/office/officeart/2008/layout/NameandTitleOrganizationalChart"/>
     <dgm:cxn modelId="{2CBB33F4-C536-48A8-ADA5-B43F9AC5C356}" type="presOf" srcId="{523E3F81-A7FD-41C6-AEFA-00BFD2D5C126}" destId="{6C4D6CE3-4FAA-4D39-8A22-7BAC7C27FEEC}" srcOrd="0" destOrd="0" presId="urn:microsoft.com/office/officeart/2008/layout/NameandTitleOrganizationalChart"/>
+    <dgm:cxn modelId="{CD927534-CFC7-47C1-9B17-0019F0864644}" type="presOf" srcId="{AAEC4A7F-26E9-49C9-A021-C41E5C07BFA0}" destId="{EFFCA47C-D5C2-4308-A844-2CC7B5C9555D}" srcOrd="0" destOrd="0" presId="urn:microsoft.com/office/officeart/2008/layout/NameandTitleOrganizationalChart"/>
+    <dgm:cxn modelId="{3D16D2A2-4449-42D5-9D81-66209F758901}" type="presOf" srcId="{98676505-2196-4383-BEFB-5F6FF8DFC4F3}" destId="{99FA17BB-8F10-4DD9-A0E2-5EA0396FA6D2}" srcOrd="0" destOrd="0" presId="urn:microsoft.com/office/officeart/2008/layout/NameandTitleOrganizationalChart"/>
+    <dgm:cxn modelId="{9ED1ECAC-6869-4938-B949-03E4C47B439C}" srcId="{48C133C3-77F3-4A71-8515-4B7725FB695C}" destId="{6C56C7E1-118B-466E-A84D-657D222A3EFB}" srcOrd="0" destOrd="0" parTransId="{523E3F81-A7FD-41C6-AEFA-00BFD2D5C126}" sibTransId="{4DD089F6-C96A-494A-9C11-C8DDFC86808E}"/>
+    <dgm:cxn modelId="{3D9C1171-7DF3-4895-A4D5-D7AE44F78779}" type="presOf" srcId="{CEA44938-41CA-4FE2-8E9C-87D351F742D9}" destId="{3E8CF59A-FAAD-44AA-979D-BA7D6881B96A}" srcOrd="0" destOrd="0" presId="urn:microsoft.com/office/officeart/2008/layout/NameandTitleOrganizationalChart"/>
+    <dgm:cxn modelId="{D2F302EA-F5B3-42B6-BB80-C2F47D9A3D6E}" srcId="{48C133C3-77F3-4A71-8515-4B7725FB695C}" destId="{98676505-2196-4383-BEFB-5F6FF8DFC4F3}" srcOrd="2" destOrd="0" parTransId="{CEA44938-41CA-4FE2-8E9C-87D351F742D9}" sibTransId="{C736C31F-CB43-4520-9C19-F939CD21C4FA}"/>
+    <dgm:cxn modelId="{645D9DC0-8FFC-426F-8418-2AB8E75A40D0}" type="presOf" srcId="{B4FA02E4-55C6-4E7F-89E1-A36E659C009D}" destId="{6A000DF7-1A06-4720-A08C-779CAA7DF395}" srcOrd="1" destOrd="0" presId="urn:microsoft.com/office/officeart/2008/layout/NameandTitleOrganizationalChart"/>
+    <dgm:cxn modelId="{E73B190F-1347-4C04-8548-5C81DA2F643E}" srcId="{48C133C3-77F3-4A71-8515-4B7725FB695C}" destId="{B4FA02E4-55C6-4E7F-89E1-A36E659C009D}" srcOrd="1" destOrd="0" parTransId="{4EEC8717-AA0F-49DE-8732-2508B3115DE0}" sibTransId="{FF9BA836-D4D1-46B4-A163-9D8812F00382}"/>
+    <dgm:cxn modelId="{A9F56E27-878A-43D2-9784-03AEE5D09378}" type="presOf" srcId="{FF9BA836-D4D1-46B4-A163-9D8812F00382}" destId="{8C87CF99-C695-483F-877F-16140EF7B842}" srcOrd="0" destOrd="0" presId="urn:microsoft.com/office/officeart/2008/layout/NameandTitleOrganizationalChart"/>
+    <dgm:cxn modelId="{960DAA28-01C0-4F45-91DD-815E65AA6D25}" type="presOf" srcId="{4DD089F6-C96A-494A-9C11-C8DDFC86808E}" destId="{40DF6143-7A1D-4CBC-A39F-187E0F34DDEB}" srcOrd="0" destOrd="0" presId="urn:microsoft.com/office/officeart/2008/layout/NameandTitleOrganizationalChart"/>
     <dgm:cxn modelId="{CEA3D494-7428-4F68-96DD-BBDE948C64B5}" type="presOf" srcId="{48C133C3-77F3-4A71-8515-4B7725FB695C}" destId="{C3B855EC-6B1E-45CD-B732-9A0DEB763F68}" srcOrd="0" destOrd="0" presId="urn:microsoft.com/office/officeart/2008/layout/NameandTitleOrganizationalChart"/>
-    <dgm:cxn modelId="{960DAA28-01C0-4F45-91DD-815E65AA6D25}" type="presOf" srcId="{4DD089F6-C96A-494A-9C11-C8DDFC86808E}" destId="{40DF6143-7A1D-4CBC-A39F-187E0F34DDEB}" srcOrd="0" destOrd="0" presId="urn:microsoft.com/office/officeart/2008/layout/NameandTitleOrganizationalChart"/>
-    <dgm:cxn modelId="{650D092C-E41D-4A25-B57D-FD16FCFF412B}" type="presOf" srcId="{6C56C7E1-118B-466E-A84D-657D222A3EFB}" destId="{B2077D14-C7CA-4B09-B173-BEA41D78B926}" srcOrd="0" destOrd="0" presId="urn:microsoft.com/office/officeart/2008/layout/NameandTitleOrganizationalChart"/>
-    <dgm:cxn modelId="{3D16D2A2-4449-42D5-9D81-66209F758901}" type="presOf" srcId="{98676505-2196-4383-BEFB-5F6FF8DFC4F3}" destId="{99FA17BB-8F10-4DD9-A0E2-5EA0396FA6D2}" srcOrd="0" destOrd="0" presId="urn:microsoft.com/office/officeart/2008/layout/NameandTitleOrganizationalChart"/>
+    <dgm:cxn modelId="{1FD7A135-E33B-4D37-A5BE-FA539DF0E667}" srcId="{56F91B86-C79C-443A-89FC-288C3CB26305}" destId="{48C133C3-77F3-4A71-8515-4B7725FB695C}" srcOrd="0" destOrd="0" parTransId="{394D730F-AAFD-4A6A-968F-99309EF15FB3}" sibTransId="{AAEC4A7F-26E9-49C9-A021-C41E5C07BFA0}"/>
+    <dgm:cxn modelId="{ACD5E262-E9D5-4616-9E7C-CC87F6F4394E}" type="presOf" srcId="{B4FA02E4-55C6-4E7F-89E1-A36E659C009D}" destId="{C1F44E9B-0435-4616-B0DF-E9661855ED10}" srcOrd="0" destOrd="0" presId="urn:microsoft.com/office/officeart/2008/layout/NameandTitleOrganizationalChart"/>
     <dgm:cxn modelId="{393F10D4-177B-4C85-B7C2-CE9D4D155555}" type="presOf" srcId="{C736C31F-CB43-4520-9C19-F939CD21C4FA}" destId="{511293F5-5A5E-445C-B435-92C4CB8E9AD6}" srcOrd="0" destOrd="0" presId="urn:microsoft.com/office/officeart/2008/layout/NameandTitleOrganizationalChart"/>
-    <dgm:cxn modelId="{1FD7A135-E33B-4D37-A5BE-FA539DF0E667}" srcId="{56F91B86-C79C-443A-89FC-288C3CB26305}" destId="{48C133C3-77F3-4A71-8515-4B7725FB695C}" srcOrd="0" destOrd="0" parTransId="{394D730F-AAFD-4A6A-968F-99309EF15FB3}" sibTransId="{AAEC4A7F-26E9-49C9-A021-C41E5C07BFA0}"/>
     <dgm:cxn modelId="{2D7F8DA9-95BE-48C8-9FE6-679FE1FAF235}" type="presOf" srcId="{48C133C3-77F3-4A71-8515-4B7725FB695C}" destId="{E4683AE9-12A6-4E1D-8807-2134BE840AFA}" srcOrd="1" destOrd="0" presId="urn:microsoft.com/office/officeart/2008/layout/NameandTitleOrganizationalChart"/>
-    <dgm:cxn modelId="{ACD5E262-E9D5-4616-9E7C-CC87F6F4394E}" type="presOf" srcId="{B4FA02E4-55C6-4E7F-89E1-A36E659C009D}" destId="{C1F44E9B-0435-4616-B0DF-E9661855ED10}" srcOrd="0" destOrd="0" presId="urn:microsoft.com/office/officeart/2008/layout/NameandTitleOrganizationalChart"/>
-    <dgm:cxn modelId="{645D9DC0-8FFC-426F-8418-2AB8E75A40D0}" type="presOf" srcId="{B4FA02E4-55C6-4E7F-89E1-A36E659C009D}" destId="{6A000DF7-1A06-4720-A08C-779CAA7DF395}" srcOrd="1" destOrd="0" presId="urn:microsoft.com/office/officeart/2008/layout/NameandTitleOrganizationalChart"/>
-    <dgm:cxn modelId="{CF846937-B19A-4065-B834-FC7D5A653E4B}" type="presOf" srcId="{6C56C7E1-118B-466E-A84D-657D222A3EFB}" destId="{443F2EA8-12E1-4F9D-B8E2-9D66197C9EA8}" srcOrd="1" destOrd="0" presId="urn:microsoft.com/office/officeart/2008/layout/NameandTitleOrganizationalChart"/>
-    <dgm:cxn modelId="{A9F56E27-878A-43D2-9784-03AEE5D09378}" type="presOf" srcId="{FF9BA836-D4D1-46B4-A163-9D8812F00382}" destId="{8C87CF99-C695-483F-877F-16140EF7B842}" srcOrd="0" destOrd="0" presId="urn:microsoft.com/office/officeart/2008/layout/NameandTitleOrganizationalChart"/>
-    <dgm:cxn modelId="{3D9C1171-7DF3-4895-A4D5-D7AE44F78779}" type="presOf" srcId="{CEA44938-41CA-4FE2-8E9C-87D351F742D9}" destId="{3E8CF59A-FAAD-44AA-979D-BA7D6881B96A}" srcOrd="0" destOrd="0" presId="urn:microsoft.com/office/officeart/2008/layout/NameandTitleOrganizationalChart"/>
-    <dgm:cxn modelId="{9B636C39-7CFA-40B2-8376-6FC260A550B2}" type="presOf" srcId="{4EEC8717-AA0F-49DE-8732-2508B3115DE0}" destId="{8D96E3EE-4EE6-47C0-BDA3-1B464380816D}" srcOrd="0" destOrd="0" presId="urn:microsoft.com/office/officeart/2008/layout/NameandTitleOrganizationalChart"/>
-    <dgm:cxn modelId="{CD927534-CFC7-47C1-9B17-0019F0864644}" type="presOf" srcId="{AAEC4A7F-26E9-49C9-A021-C41E5C07BFA0}" destId="{EFFCA47C-D5C2-4308-A844-2CC7B5C9555D}" srcOrd="0" destOrd="0" presId="urn:microsoft.com/office/officeart/2008/layout/NameandTitleOrganizationalChart"/>
-    <dgm:cxn modelId="{C477F7AD-84AD-48A4-AA50-BC2C18AF229C}" type="presOf" srcId="{98676505-2196-4383-BEFB-5F6FF8DFC4F3}" destId="{00BA90B6-26AF-4594-9663-43A9B290A14C}" srcOrd="1" destOrd="0" presId="urn:microsoft.com/office/officeart/2008/layout/NameandTitleOrganizationalChart"/>
-    <dgm:cxn modelId="{D2F302EA-F5B3-42B6-BB80-C2F47D9A3D6E}" srcId="{48C133C3-77F3-4A71-8515-4B7725FB695C}" destId="{98676505-2196-4383-BEFB-5F6FF8DFC4F3}" srcOrd="2" destOrd="0" parTransId="{CEA44938-41CA-4FE2-8E9C-87D351F742D9}" sibTransId="{C736C31F-CB43-4520-9C19-F939CD21C4FA}"/>
-    <dgm:cxn modelId="{E73B190F-1347-4C04-8548-5C81DA2F643E}" srcId="{48C133C3-77F3-4A71-8515-4B7725FB695C}" destId="{B4FA02E4-55C6-4E7F-89E1-A36E659C009D}" srcOrd="1" destOrd="0" parTransId="{4EEC8717-AA0F-49DE-8732-2508B3115DE0}" sibTransId="{FF9BA836-D4D1-46B4-A163-9D8812F00382}"/>
-    <dgm:cxn modelId="{7099AADB-E474-47E6-AA7C-4BD0C5FC6EE1}" type="presOf" srcId="{56F91B86-C79C-443A-89FC-288C3CB26305}" destId="{BF944616-80E6-4E36-ADDD-11AD911A0320}" srcOrd="0" destOrd="0" presId="urn:microsoft.com/office/officeart/2008/layout/NameandTitleOrganizationalChart"/>
-    <dgm:cxn modelId="{9ED1ECAC-6869-4938-B949-03E4C47B439C}" srcId="{48C133C3-77F3-4A71-8515-4B7725FB695C}" destId="{6C56C7E1-118B-466E-A84D-657D222A3EFB}" srcOrd="0" destOrd="0" parTransId="{523E3F81-A7FD-41C6-AEFA-00BFD2D5C126}" sibTransId="{4DD089F6-C96A-494A-9C11-C8DDFC86808E}"/>
     <dgm:cxn modelId="{3902450A-7843-4637-80FA-BB14C78F6EAA}" type="presParOf" srcId="{BF944616-80E6-4E36-ADDD-11AD911A0320}" destId="{0DA0A989-CBED-4B19-A3FE-81EAF897B5B7}" srcOrd="0" destOrd="0" presId="urn:microsoft.com/office/officeart/2008/layout/NameandTitleOrganizationalChart"/>
     <dgm:cxn modelId="{49213C75-DDFD-44AB-A7B2-7644A05400B0}" type="presParOf" srcId="{0DA0A989-CBED-4B19-A3FE-81EAF897B5B7}" destId="{883C57D8-1D69-4462-80B0-001A9CD31D04}" srcOrd="0" destOrd="0" presId="urn:microsoft.com/office/officeart/2008/layout/NameandTitleOrganizationalChart"/>
     <dgm:cxn modelId="{7CB2EAE3-2CE4-4650-BB62-55486DCEB8C2}" type="presParOf" srcId="{883C57D8-1D69-4462-80B0-001A9CD31D04}" destId="{C3B855EC-6B1E-45CD-B732-9A0DEB763F68}" srcOrd="0" destOrd="0" presId="urn:microsoft.com/office/officeart/2008/layout/NameandTitleOrganizationalChart"/>
@@ -3169,373 +3260,6 @@
       <dsp:cNvGrpSpPr/>
     </dsp:nvGrpSpPr>
     <dsp:grpSpPr/>
-    <dsp:sp modelId="{A746EB11-4E99-4B13-AEEF-24EDCB1826B8}">
-      <dsp:nvSpPr>
-        <dsp:cNvPr id="0" name=""/>
-        <dsp:cNvSpPr/>
-      </dsp:nvSpPr>
-      <dsp:spPr>
-        <a:xfrm>
-          <a:off x="1366" y="1803466"/>
-          <a:ext cx="1811734" cy="1811734"/>
-        </a:xfrm>
-        <a:prstGeom prst="ellipse">
-          <a:avLst/>
-        </a:prstGeom>
-        <a:solidFill>
-          <a:schemeClr val="accent1">
-            <a:hueOff val="0"/>
-            <a:satOff val="0"/>
-            <a:lumOff val="0"/>
-            <a:alphaOff val="0"/>
-          </a:schemeClr>
-        </a:solidFill>
-        <a:ln w="19050" cap="rnd" cmpd="sng" algn="ctr">
-          <a:solidFill>
-            <a:schemeClr val="lt1">
-              <a:hueOff val="0"/>
-              <a:satOff val="0"/>
-              <a:lumOff val="0"/>
-              <a:alphaOff val="0"/>
-            </a:schemeClr>
-          </a:solidFill>
-          <a:prstDash val="solid"/>
-        </a:ln>
-        <a:effectLst/>
-      </dsp:spPr>
-      <dsp:style>
-        <a:lnRef idx="2">
-          <a:scrgbClr r="0" g="0" b="0"/>
-        </a:lnRef>
-        <a:fillRef idx="1">
-          <a:scrgbClr r="0" g="0" b="0"/>
-        </a:fillRef>
-        <a:effectRef idx="0">
-          <a:scrgbClr r="0" g="0" b="0"/>
-        </a:effectRef>
-        <a:fontRef idx="minor">
-          <a:schemeClr val="lt1"/>
-        </a:fontRef>
-      </dsp:style>
-      <dsp:txBody>
-        <a:bodyPr spcFirstLastPara="0" vert="horz" wrap="square" lIns="25400" tIns="25400" rIns="25400" bIns="25400" numCol="1" spcCol="1270" anchor="ctr" anchorCtr="0">
-          <a:noAutofit/>
-        </a:bodyPr>
-        <a:lstStyle/>
-        <a:p>
-          <a:pPr lvl="0" algn="ctr" defTabSz="889000">
-            <a:lnSpc>
-              <a:spcPct val="90000"/>
-            </a:lnSpc>
-            <a:spcBef>
-              <a:spcPct val="0"/>
-            </a:spcBef>
-            <a:spcAft>
-              <a:spcPct val="35000"/>
-            </a:spcAft>
-          </a:pPr>
-          <a:r>
-            <a:rPr lang="en-US" sz="2000" kern="1200" dirty="0" err="1" smtClean="0"/>
-            <a:t>OmniSharp</a:t>
-          </a:r>
-          <a:endParaRPr lang="en-US" sz="2000" kern="1200" dirty="0"/>
-        </a:p>
-      </dsp:txBody>
-      <dsp:txXfrm>
-        <a:off x="266688" y="2068788"/>
-        <a:ext cx="1281090" cy="1281090"/>
-      </dsp:txXfrm>
-    </dsp:sp>
-    <dsp:sp modelId="{99021CD3-1159-400A-919E-59EF40167229}">
-      <dsp:nvSpPr>
-        <dsp:cNvPr id="0" name=""/>
-        <dsp:cNvSpPr/>
-      </dsp:nvSpPr>
-      <dsp:spPr>
-        <a:xfrm>
-          <a:off x="1960214" y="2183930"/>
-          <a:ext cx="1050805" cy="1050805"/>
-        </a:xfrm>
-        <a:prstGeom prst="mathPlus">
-          <a:avLst/>
-        </a:prstGeom>
-        <a:solidFill>
-          <a:schemeClr val="accent1">
-            <a:tint val="60000"/>
-            <a:hueOff val="0"/>
-            <a:satOff val="0"/>
-            <a:lumOff val="0"/>
-            <a:alphaOff val="0"/>
-          </a:schemeClr>
-        </a:solidFill>
-        <a:ln>
-          <a:noFill/>
-        </a:ln>
-        <a:effectLst/>
-      </dsp:spPr>
-      <dsp:style>
-        <a:lnRef idx="0">
-          <a:scrgbClr r="0" g="0" b="0"/>
-        </a:lnRef>
-        <a:fillRef idx="1">
-          <a:scrgbClr r="0" g="0" b="0"/>
-        </a:fillRef>
-        <a:effectRef idx="0">
-          <a:scrgbClr r="0" g="0" b="0"/>
-        </a:effectRef>
-        <a:fontRef idx="minor">
-          <a:schemeClr val="lt1"/>
-        </a:fontRef>
-      </dsp:style>
-      <dsp:txBody>
-        <a:bodyPr spcFirstLastPara="0" vert="horz" wrap="square" lIns="0" tIns="0" rIns="0" bIns="0" numCol="1" spcCol="1270" anchor="ctr" anchorCtr="0">
-          <a:noAutofit/>
-        </a:bodyPr>
-        <a:lstStyle/>
-        <a:p>
-          <a:pPr lvl="0" algn="ctr" defTabSz="711200">
-            <a:lnSpc>
-              <a:spcPct val="90000"/>
-            </a:lnSpc>
-            <a:spcBef>
-              <a:spcPct val="0"/>
-            </a:spcBef>
-            <a:spcAft>
-              <a:spcPct val="35000"/>
-            </a:spcAft>
-          </a:pPr>
-          <a:endParaRPr lang="en-US" sz="1600" kern="1200"/>
-        </a:p>
-      </dsp:txBody>
-      <dsp:txXfrm>
-        <a:off x="2099498" y="2585758"/>
-        <a:ext cx="772237" cy="247149"/>
-      </dsp:txXfrm>
-    </dsp:sp>
-    <dsp:sp modelId="{2BDF25E0-CBF6-4302-B6F7-03617650C5D2}">
-      <dsp:nvSpPr>
-        <dsp:cNvPr id="0" name=""/>
-        <dsp:cNvSpPr/>
-      </dsp:nvSpPr>
-      <dsp:spPr>
-        <a:xfrm>
-          <a:off x="3158132" y="1803466"/>
-          <a:ext cx="1811734" cy="1811734"/>
-        </a:xfrm>
-        <a:prstGeom prst="ellipse">
-          <a:avLst/>
-        </a:prstGeom>
-        <a:solidFill>
-          <a:schemeClr val="accent1">
-            <a:hueOff val="0"/>
-            <a:satOff val="0"/>
-            <a:lumOff val="0"/>
-            <a:alphaOff val="0"/>
-          </a:schemeClr>
-        </a:solidFill>
-        <a:ln w="19050" cap="rnd" cmpd="sng" algn="ctr">
-          <a:solidFill>
-            <a:schemeClr val="lt1">
-              <a:hueOff val="0"/>
-              <a:satOff val="0"/>
-              <a:lumOff val="0"/>
-              <a:alphaOff val="0"/>
-            </a:schemeClr>
-          </a:solidFill>
-          <a:prstDash val="solid"/>
-        </a:ln>
-        <a:effectLst/>
-      </dsp:spPr>
-      <dsp:style>
-        <a:lnRef idx="2">
-          <a:scrgbClr r="0" g="0" b="0"/>
-        </a:lnRef>
-        <a:fillRef idx="1">
-          <a:scrgbClr r="0" g="0" b="0"/>
-        </a:fillRef>
-        <a:effectRef idx="0">
-          <a:scrgbClr r="0" g="0" b="0"/>
-        </a:effectRef>
-        <a:fontRef idx="minor">
-          <a:schemeClr val="lt1"/>
-        </a:fontRef>
-      </dsp:style>
-      <dsp:txBody>
-        <a:bodyPr spcFirstLastPara="0" vert="horz" wrap="square" lIns="25400" tIns="25400" rIns="25400" bIns="25400" numCol="1" spcCol="1270" anchor="ctr" anchorCtr="0">
-          <a:noAutofit/>
-        </a:bodyPr>
-        <a:lstStyle/>
-        <a:p>
-          <a:pPr lvl="0" algn="ctr" defTabSz="889000">
-            <a:lnSpc>
-              <a:spcPct val="90000"/>
-            </a:lnSpc>
-            <a:spcBef>
-              <a:spcPct val="0"/>
-            </a:spcBef>
-            <a:spcAft>
-              <a:spcPct val="35000"/>
-            </a:spcAft>
-          </a:pPr>
-          <a:r>
-            <a:rPr lang="en-US" sz="2000" kern="1200" dirty="0" smtClean="0"/>
-            <a:t>Yeoman</a:t>
-          </a:r>
-          <a:endParaRPr lang="en-US" sz="2000" kern="1200" dirty="0"/>
-        </a:p>
-      </dsp:txBody>
-      <dsp:txXfrm>
-        <a:off x="3423454" y="2068788"/>
-        <a:ext cx="1281090" cy="1281090"/>
-      </dsp:txXfrm>
-    </dsp:sp>
-    <dsp:sp modelId="{0CEB9DC7-5783-4ACD-BCD5-4EF3BE321E8C}">
-      <dsp:nvSpPr>
-        <dsp:cNvPr id="0" name=""/>
-        <dsp:cNvSpPr/>
-      </dsp:nvSpPr>
-      <dsp:spPr>
-        <a:xfrm>
-          <a:off x="5116980" y="2183930"/>
-          <a:ext cx="1050805" cy="1050805"/>
-        </a:xfrm>
-        <a:prstGeom prst="mathEqual">
-          <a:avLst/>
-        </a:prstGeom>
-        <a:solidFill>
-          <a:schemeClr val="accent1">
-            <a:tint val="60000"/>
-            <a:hueOff val="0"/>
-            <a:satOff val="0"/>
-            <a:lumOff val="0"/>
-            <a:alphaOff val="0"/>
-          </a:schemeClr>
-        </a:solidFill>
-        <a:ln>
-          <a:noFill/>
-        </a:ln>
-        <a:effectLst/>
-      </dsp:spPr>
-      <dsp:style>
-        <a:lnRef idx="0">
-          <a:scrgbClr r="0" g="0" b="0"/>
-        </a:lnRef>
-        <a:fillRef idx="1">
-          <a:scrgbClr r="0" g="0" b="0"/>
-        </a:fillRef>
-        <a:effectRef idx="0">
-          <a:scrgbClr r="0" g="0" b="0"/>
-        </a:effectRef>
-        <a:fontRef idx="minor">
-          <a:schemeClr val="lt1"/>
-        </a:fontRef>
-      </dsp:style>
-      <dsp:txBody>
-        <a:bodyPr spcFirstLastPara="0" vert="horz" wrap="square" lIns="0" tIns="0" rIns="0" bIns="0" numCol="1" spcCol="1270" anchor="ctr" anchorCtr="0">
-          <a:noAutofit/>
-        </a:bodyPr>
-        <a:lstStyle/>
-        <a:p>
-          <a:pPr lvl="0" algn="ctr" defTabSz="711200">
-            <a:lnSpc>
-              <a:spcPct val="90000"/>
-            </a:lnSpc>
-            <a:spcBef>
-              <a:spcPct val="0"/>
-            </a:spcBef>
-            <a:spcAft>
-              <a:spcPct val="35000"/>
-            </a:spcAft>
-          </a:pPr>
-          <a:endParaRPr lang="en-US" sz="1600" kern="1200"/>
-        </a:p>
-      </dsp:txBody>
-      <dsp:txXfrm>
-        <a:off x="5256264" y="2400396"/>
-        <a:ext cx="772237" cy="617873"/>
-      </dsp:txXfrm>
-    </dsp:sp>
-    <dsp:sp modelId="{935B9248-D5AC-4608-BFDB-4CC18A641197}">
-      <dsp:nvSpPr>
-        <dsp:cNvPr id="0" name=""/>
-        <dsp:cNvSpPr/>
-      </dsp:nvSpPr>
-      <dsp:spPr>
-        <a:xfrm>
-          <a:off x="6314898" y="1803466"/>
-          <a:ext cx="1811734" cy="1811734"/>
-        </a:xfrm>
-        <a:prstGeom prst="ellipse">
-          <a:avLst/>
-        </a:prstGeom>
-        <a:solidFill>
-          <a:schemeClr val="accent1">
-            <a:hueOff val="0"/>
-            <a:satOff val="0"/>
-            <a:lumOff val="0"/>
-            <a:alphaOff val="0"/>
-          </a:schemeClr>
-        </a:solidFill>
-        <a:ln w="19050" cap="rnd" cmpd="sng" algn="ctr">
-          <a:solidFill>
-            <a:schemeClr val="lt1">
-              <a:hueOff val="0"/>
-              <a:satOff val="0"/>
-              <a:lumOff val="0"/>
-              <a:alphaOff val="0"/>
-            </a:schemeClr>
-          </a:solidFill>
-          <a:prstDash val="solid"/>
-        </a:ln>
-        <a:effectLst/>
-      </dsp:spPr>
-      <dsp:style>
-        <a:lnRef idx="2">
-          <a:scrgbClr r="0" g="0" b="0"/>
-        </a:lnRef>
-        <a:fillRef idx="1">
-          <a:scrgbClr r="0" g="0" b="0"/>
-        </a:fillRef>
-        <a:effectRef idx="0">
-          <a:scrgbClr r="0" g="0" b="0"/>
-        </a:effectRef>
-        <a:fontRef idx="minor">
-          <a:schemeClr val="lt1"/>
-        </a:fontRef>
-      </dsp:style>
-      <dsp:txBody>
-        <a:bodyPr spcFirstLastPara="0" vert="horz" wrap="square" lIns="25400" tIns="25400" rIns="25400" bIns="25400" numCol="1" spcCol="1270" anchor="ctr" anchorCtr="0">
-          <a:noAutofit/>
-        </a:bodyPr>
-        <a:lstStyle/>
-        <a:p>
-          <a:pPr lvl="0" algn="ctr" defTabSz="889000">
-            <a:lnSpc>
-              <a:spcPct val="90000"/>
-            </a:lnSpc>
-            <a:spcBef>
-              <a:spcPct val="0"/>
-            </a:spcBef>
-            <a:spcAft>
-              <a:spcPct val="35000"/>
-            </a:spcAft>
-          </a:pPr>
-          <a:r>
-            <a:rPr lang="en-US" sz="2000" kern="1200" dirty="0" smtClean="0"/>
-            <a:t>generator-</a:t>
-          </a:r>
-          <a:r>
-            <a:rPr lang="en-US" sz="2000" kern="1200" dirty="0" err="1" smtClean="0"/>
-            <a:t>aspnet</a:t>
-          </a:r>
-          <a:endParaRPr lang="en-US" sz="2000" kern="1200" dirty="0"/>
-        </a:p>
-      </dsp:txBody>
-      <dsp:txXfrm>
-        <a:off x="6580220" y="2068788"/>
-        <a:ext cx="1281090" cy="1281090"/>
-      </dsp:txXfrm>
-    </dsp:sp>
   </dsp:spTree>
 </dsp:drawing>
 </file>
@@ -7026,7 +6750,7 @@
           <a:p>
             <a:fld id="{DFB3EBE0-77A0-4731-B691-855A17DBDF42}" type="datetimeFigureOut">
               <a:rPr lang="en-US" smtClean="0"/>
-              <a:t>11/13/2015</a:t>
+              <a:t>11/14/2015</a:t>
             </a:fld>
             <a:endParaRPr lang="en-US"/>
           </a:p>
@@ -8123,7 +7847,7 @@
           <a:p>
             <a:fld id="{184BFEAB-C714-4D5C-A87B-1F5F147C2568}" type="datetime1">
               <a:rPr lang="en-US" smtClean="0"/>
-              <a:t>11/13/2015</a:t>
+              <a:t>11/14/2015</a:t>
             </a:fld>
             <a:endParaRPr lang="en-US"/>
           </a:p>
@@ -8374,7 +8098,7 @@
           <a:p>
             <a:fld id="{9A92CE8C-71B3-4605-911C-C2357D36982A}" type="datetime1">
               <a:rPr lang="en-US" smtClean="0"/>
-              <a:t>11/13/2015</a:t>
+              <a:t>11/14/2015</a:t>
             </a:fld>
             <a:endParaRPr lang="en-US"/>
           </a:p>
@@ -8688,7 +8412,7 @@
           <a:p>
             <a:fld id="{015B728D-6EF1-44C1-BE74-A3569BAB8718}" type="datetime1">
               <a:rPr lang="en-US" smtClean="0"/>
-              <a:t>11/13/2015</a:t>
+              <a:t>11/14/2015</a:t>
             </a:fld>
             <a:endParaRPr lang="en-US"/>
           </a:p>
@@ -9021,7 +8745,7 @@
           <a:p>
             <a:fld id="{60F7EA30-F0F4-4B8A-BDF6-A084B0E8ACEE}" type="datetime1">
               <a:rPr lang="en-US" smtClean="0"/>
-              <a:t>11/13/2015</a:t>
+              <a:t>11/14/2015</a:t>
             </a:fld>
             <a:endParaRPr lang="en-US"/>
           </a:p>
@@ -9335,7 +9059,7 @@
           <a:p>
             <a:fld id="{F0EF549A-B982-48AE-849E-ED681B3F14FB}" type="datetime1">
               <a:rPr lang="en-US" smtClean="0"/>
-              <a:t>11/13/2015</a:t>
+              <a:t>11/14/2015</a:t>
             </a:fld>
             <a:endParaRPr lang="en-US"/>
           </a:p>
@@ -9728,7 +9452,7 @@
           <a:p>
             <a:fld id="{4A5FF696-44D7-45D2-8329-B53AF65ECE1F}" type="datetime1">
               <a:rPr lang="en-US" smtClean="0"/>
-              <a:t>11/13/2015</a:t>
+              <a:t>11/14/2015</a:t>
             </a:fld>
             <a:endParaRPr lang="en-US"/>
           </a:p>
@@ -9898,7 +9622,7 @@
           <a:p>
             <a:fld id="{D4E746AE-4EBB-48DA-A9A3-3CF4B615F483}" type="datetime1">
               <a:rPr lang="en-US" smtClean="0"/>
-              <a:t>11/13/2015</a:t>
+              <a:t>11/14/2015</a:t>
             </a:fld>
             <a:endParaRPr lang="en-US"/>
           </a:p>
@@ -10078,7 +9802,7 @@
           <a:p>
             <a:fld id="{5B1FEA50-B64E-45AF-A77E-1C43A8E7D5C1}" type="datetime1">
               <a:rPr lang="en-US" smtClean="0"/>
-              <a:t>11/13/2015</a:t>
+              <a:t>11/14/2015</a:t>
             </a:fld>
             <a:endParaRPr lang="en-US"/>
           </a:p>
@@ -10248,7 +9972,7 @@
           <a:p>
             <a:fld id="{5EE2A00C-C0A5-41E4-A254-0933BFC59600}" type="datetime1">
               <a:rPr lang="en-US" smtClean="0"/>
-              <a:t>11/13/2015</a:t>
+              <a:t>11/14/2015</a:t>
             </a:fld>
             <a:endParaRPr lang="en-US"/>
           </a:p>
@@ -10495,7 +10219,7 @@
           <a:p>
             <a:fld id="{C0C43579-370D-44CE-9989-325065EBA03B}" type="datetime1">
               <a:rPr lang="en-US" smtClean="0"/>
-              <a:t>11/13/2015</a:t>
+              <a:t>11/14/2015</a:t>
             </a:fld>
             <a:endParaRPr lang="en-US"/>
           </a:p>
@@ -10727,7 +10451,7 @@
           <a:p>
             <a:fld id="{29D814BD-9B18-4EA5-94F4-F1600C017603}" type="datetime1">
               <a:rPr lang="en-US" smtClean="0"/>
-              <a:t>11/13/2015</a:t>
+              <a:t>11/14/2015</a:t>
             </a:fld>
             <a:endParaRPr lang="en-US"/>
           </a:p>
@@ -11101,7 +10825,7 @@
           <a:p>
             <a:fld id="{CE8DCA57-17F0-4F45-8BC0-620199D29CBA}" type="datetime1">
               <a:rPr lang="en-US" smtClean="0"/>
-              <a:t>11/13/2015</a:t>
+              <a:t>11/14/2015</a:t>
             </a:fld>
             <a:endParaRPr lang="en-US"/>
           </a:p>
@@ -11224,7 +10948,7 @@
           <a:p>
             <a:fld id="{5507D437-E8BB-44EC-A888-137BD165F5EF}" type="datetime1">
               <a:rPr lang="en-US" smtClean="0"/>
-              <a:t>11/13/2015</a:t>
+              <a:t>11/14/2015</a:t>
             </a:fld>
             <a:endParaRPr lang="en-US"/>
           </a:p>
@@ -11319,7 +11043,7 @@
           <a:p>
             <a:fld id="{CBF48491-12CB-4315-A294-ECCB7042AE60}" type="datetime1">
               <a:rPr lang="en-US" smtClean="0"/>
-              <a:t>11/13/2015</a:t>
+              <a:t>11/14/2015</a:t>
             </a:fld>
             <a:endParaRPr lang="en-US"/>
           </a:p>
@@ -11574,7 +11298,7 @@
           <a:p>
             <a:fld id="{71547693-6F8C-49B3-B3CF-B2F3832F2060}" type="datetime1">
               <a:rPr lang="en-US" smtClean="0"/>
-              <a:t>11/13/2015</a:t>
+              <a:t>11/14/2015</a:t>
             </a:fld>
             <a:endParaRPr lang="en-US"/>
           </a:p>
@@ -11879,7 +11603,7 @@
           <a:p>
             <a:fld id="{891130D9-17AA-473C-8916-496E81563AE5}" type="datetime1">
               <a:rPr lang="en-US" smtClean="0"/>
-              <a:t>11/13/2015</a:t>
+              <a:t>11/14/2015</a:t>
             </a:fld>
             <a:endParaRPr lang="en-US"/>
           </a:p>
@@ -12581,7 +12305,7 @@
           <a:p>
             <a:fld id="{D84A2DE9-5A38-4CE7-AE12-F8EA769E5C95}" type="datetime1">
               <a:rPr lang="en-US" smtClean="0"/>
-              <a:t>11/13/2015</a:t>
+              <a:t>11/14/2015</a:t>
             </a:fld>
             <a:endParaRPr lang="en-US"/>
           </a:p>
@@ -13451,8 +13175,8 @@
           </a:prstGeom>
         </p:spPr>
       </p:pic>
-      <mc:AlternateContent xmlns:mc="http://schemas.openxmlformats.org/markup-compatibility/2006" xmlns:we="http://schemas.microsoft.com/office/webextensions/webextension/2010/11" xmlns:pca="http://schemas.microsoft.com/office/powerpoint/2013/contentapp">
-        <mc:Choice Requires="we pca">
+      <mc:AlternateContent xmlns:mc="http://schemas.openxmlformats.org/markup-compatibility/2006">
+        <mc:Choice xmlns="" xmlns:pca="http://schemas.microsoft.com/office/powerpoint/2013/contentapp" xmlns:we="http://schemas.microsoft.com/office/webextensions/webextension/2010/11" Requires="we pca">
           <p:graphicFrame>
             <p:nvGraphicFramePr>
               <p:cNvPr id="7" name="Add-in 6" title="Code Presenter Pro"/>
@@ -13478,7 +13202,7 @@
             </a:graphic>
           </p:graphicFrame>
         </mc:Choice>
-        <mc:Fallback xmlns="">
+        <mc:Fallback>
           <p:pic>
             <p:nvPicPr>
               <p:cNvPr id="7" name="Add-in 6" title="Code Presenter Pro"/>
@@ -14103,8 +13827,8 @@
           </a:p>
         </p:txBody>
       </p:sp>
-      <mc:AlternateContent xmlns:mc="http://schemas.openxmlformats.org/markup-compatibility/2006" xmlns:we="http://schemas.microsoft.com/office/webextensions/webextension/2010/11" xmlns:pca="http://schemas.microsoft.com/office/powerpoint/2013/contentapp">
-        <mc:Choice Requires="we pca">
+      <mc:AlternateContent xmlns:mc="http://schemas.openxmlformats.org/markup-compatibility/2006">
+        <mc:Choice xmlns="" xmlns:pca="http://schemas.microsoft.com/office/powerpoint/2013/contentapp" xmlns:we="http://schemas.microsoft.com/office/webextensions/webextension/2010/11" Requires="we pca">
           <p:graphicFrame>
             <p:nvGraphicFramePr>
               <p:cNvPr id="5" name="Add-in 4" title="Code Presenter Pro"/>
@@ -14130,7 +13854,7 @@
             </a:graphic>
           </p:graphicFrame>
         </mc:Choice>
-        <mc:Fallback xmlns="">
+        <mc:Fallback>
           <p:pic>
             <p:nvPicPr>
               <p:cNvPr id="5" name="Add-in 4" title="Code Presenter Pro"/>
@@ -14199,8 +13923,8 @@
           </a:p>
         </p:txBody>
       </p:sp>
-      <mc:AlternateContent xmlns:mc="http://schemas.openxmlformats.org/markup-compatibility/2006" xmlns:we="http://schemas.microsoft.com/office/webextensions/webextension/2010/11" xmlns:pca="http://schemas.microsoft.com/office/powerpoint/2013/contentapp">
-        <mc:Choice Requires="we pca">
+      <mc:AlternateContent xmlns:mc="http://schemas.openxmlformats.org/markup-compatibility/2006">
+        <mc:Choice xmlns="" xmlns:pca="http://schemas.microsoft.com/office/powerpoint/2013/contentapp" xmlns:we="http://schemas.microsoft.com/office/webextensions/webextension/2010/11" Requires="we pca">
           <p:graphicFrame>
             <p:nvGraphicFramePr>
               <p:cNvPr id="7" name="Add-in 6" title="Code Presenter Pro"/>
@@ -14226,7 +13950,7 @@
             </a:graphic>
           </p:graphicFrame>
         </mc:Choice>
-        <mc:Fallback xmlns="">
+        <mc:Fallback>
           <p:pic>
             <p:nvPicPr>
               <p:cNvPr id="7" name="Add-in 6" title="Code Presenter Pro"/>
@@ -14550,8 +14274,8 @@
           </a:p>
         </p:txBody>
       </p:sp>
-      <mc:AlternateContent xmlns:mc="http://schemas.openxmlformats.org/markup-compatibility/2006" xmlns:we="http://schemas.microsoft.com/office/webextensions/webextension/2010/11" xmlns:pca="http://schemas.microsoft.com/office/powerpoint/2013/contentapp">
-        <mc:Choice Requires="we pca">
+      <mc:AlternateContent xmlns:mc="http://schemas.openxmlformats.org/markup-compatibility/2006">
+        <mc:Choice xmlns="" xmlns:pca="http://schemas.microsoft.com/office/powerpoint/2013/contentapp" xmlns:we="http://schemas.microsoft.com/office/webextensions/webextension/2010/11" Requires="we pca">
           <p:graphicFrame>
             <p:nvGraphicFramePr>
               <p:cNvPr id="5" name="Add-in 4" title="Code Presenter Pro"/>
@@ -14577,7 +14301,7 @@
             </a:graphic>
           </p:graphicFrame>
         </mc:Choice>
-        <mc:Fallback xmlns="">
+        <mc:Fallback>
           <p:pic>
             <p:nvPicPr>
               <p:cNvPr id="5" name="Add-in 4" title="Code Presenter Pro"/>
@@ -16373,6 +16097,30 @@
               </a:rPr>
               <a:t> course</a:t>
             </a:r>
+            <a:endParaRPr lang="en-US" dirty="0" smtClean="0"/>
+          </a:p>
+          <a:p>
+            <a:endParaRPr lang="en-US" dirty="0"/>
+          </a:p>
+          <a:p>
+            <a:r>
+              <a:rPr lang="en-US" dirty="0" err="1">
+                <a:hlinkClick r:id="rId7"/>
+              </a:rPr>
+              <a:t>d</a:t>
+            </a:r>
+            <a:r>
+              <a:rPr lang="en-US" dirty="0" err="1" smtClean="0">
+                <a:hlinkClick r:id="rId7"/>
+              </a:rPr>
+              <a:t>nx</a:t>
+            </a:r>
+            <a:r>
+              <a:rPr lang="en-US" dirty="0" smtClean="0">
+                <a:hlinkClick r:id="rId7"/>
+              </a:rPr>
+              <a:t>-watch w/ VS Code</a:t>
+            </a:r>
             <a:endParaRPr lang="en-US" dirty="0"/>
           </a:p>
         </p:txBody>
@@ -17030,7 +16778,32 @@
             </a:r>
             <a:r>
               <a:rPr lang="en-US" dirty="0" smtClean="0"/>
-              <a:t>Utility)</a:t>
+              <a:t>Utility</a:t>
+            </a:r>
+            <a:r>
+              <a:rPr lang="en-US" dirty="0" smtClean="0"/>
+              <a:t>)</a:t>
+            </a:r>
+          </a:p>
+          <a:p>
+            <a:endParaRPr lang="en-US" dirty="0"/>
+          </a:p>
+          <a:p>
+            <a:endParaRPr lang="en-US" dirty="0" smtClean="0"/>
+          </a:p>
+          <a:p>
+            <a:endParaRPr lang="en-US" dirty="0"/>
+          </a:p>
+          <a:p>
+            <a:r>
+              <a:rPr lang="en-US" smtClean="0"/>
+              <a:t>Installation of DN* Tooling: </a:t>
+            </a:r>
+            <a:r>
+              <a:rPr lang="en-US" dirty="0">
+                <a:hlinkClick r:id="rId2"/>
+              </a:rPr>
+              <a:t>http://bit.ly/1YaRWJY</a:t>
             </a:r>
             <a:endParaRPr lang="en-US" dirty="0"/>
           </a:p>
@@ -17430,7 +17203,6 @@
               <a:rPr lang="en-US" dirty="0" smtClean="0"/>
               <a:t>2 runtime types:	</a:t>
             </a:r>
-            <a:endParaRPr lang="en-US" dirty="0" smtClean="0"/>
           </a:p>
           <a:p>
             <a:pPr lvl="1">
@@ -17447,17 +17219,8 @@
             <a:pPr lvl="2"/>
             <a:r>
               <a:rPr lang="en-US" dirty="0" smtClean="0"/>
-              <a:t>rely </a:t>
-            </a:r>
-            <a:r>
-              <a:rPr lang="en-US" dirty="0" smtClean="0"/>
-              <a:t>on .NET being installed on </a:t>
-            </a:r>
-            <a:r>
-              <a:rPr lang="en-US" dirty="0" smtClean="0"/>
-              <a:t>machine</a:t>
-            </a:r>
-            <a:endParaRPr lang="en-US" dirty="0" smtClean="0"/>
+              <a:t>rely on .NET being installed on machine</a:t>
+            </a:r>
           </a:p>
           <a:p>
             <a:pPr lvl="1">
@@ -17474,17 +17237,8 @@
             <a:pPr lvl="2"/>
             <a:r>
               <a:rPr lang="en-US" dirty="0" smtClean="0"/>
-              <a:t>can </a:t>
-            </a:r>
-            <a:r>
-              <a:rPr lang="en-US" dirty="0" smtClean="0"/>
-              <a:t>be deployed w/ </a:t>
-            </a:r>
-            <a:r>
-              <a:rPr lang="en-US" dirty="0" smtClean="0"/>
-              <a:t>app</a:t>
-            </a:r>
-            <a:endParaRPr lang="en-US" dirty="0" smtClean="0"/>
+              <a:t>can be deployed w/ app</a:t>
+            </a:r>
           </a:p>
         </p:txBody>
       </p:sp>
@@ -18514,7 +18268,7 @@
   <a:extraClrSchemeLst/>
   <a:extLst>
     <a:ext uri="{05A4C25C-085E-4340-85A3-A5531E510DB2}">
-      <thm15:themeFamily xmlns:thm15="http://schemas.microsoft.com/office/thememl/2012/main" name="Facet" id="{C0C680CD-088A-49FC-A102-D699147F32B2}" vid="{0B5AB586-D108-4FC1-8368-649FE654B894}"/>
+      <thm15:themeFamily xmlns="" xmlns:thm15="http://schemas.microsoft.com/office/thememl/2012/main" name="Facet" id="{C0C680CD-088A-49FC-A102-D699147F32B2}" vid="{0B5AB586-D108-4FC1-8368-649FE654B894}"/>
     </a:ext>
   </a:extLst>
 </a:theme>
@@ -18775,7 +18529,7 @@
   <a:extraClrSchemeLst/>
   <a:extLst>
     <a:ext uri="{05A4C25C-085E-4340-85A3-A5531E510DB2}">
-      <thm15:themeFamily xmlns:thm15="http://schemas.microsoft.com/office/thememl/2012/main" name="Office Theme" id="{62F939B6-93AF-4DB8-9C6B-D6C7DFDC589F}" vid="{4A3C46E8-61CC-4603-A589-7422A47A8E4A}"/>
+      <thm15:themeFamily xmlns="" xmlns:thm15="http://schemas.microsoft.com/office/thememl/2012/main" name="Office Theme" id="{62F939B6-93AF-4DB8-9C6B-D6C7DFDC589F}" vid="{4A3C46E8-61CC-4603-A589-7422A47A8E4A}"/>
     </a:ext>
   </a:extLst>
 </a:theme>

</xml_diff>

<commit_message>
Adjusted sizing of code sample boxes
</commit_message>
<xml_diff>
--- a/Getting Started with ASP.NET 5 in VS Code.pptx
+++ b/Getting Started with ASP.NET 5 in VS Code.pptx
@@ -127,7 +127,7 @@
   </p:defaultTextStyle>
   <p:extLst>
     <p:ext uri="{EFAFB233-063F-42B5-8137-9DF3F51BA10A}">
-      <p15:sldGuideLst xmlns="" xmlns:p15="http://schemas.microsoft.com/office/powerpoint/2012/main">
+      <p15:sldGuideLst xmlns:p15="http://schemas.microsoft.com/office/powerpoint/2012/main">
         <p15:guide id="1" orient="horz" pos="2160" userDrawn="1">
           <p15:clr>
             <a:srgbClr val="A4A3A4"/>
@@ -3260,6 +3260,373 @@
       <dsp:cNvGrpSpPr/>
     </dsp:nvGrpSpPr>
     <dsp:grpSpPr/>
+    <dsp:sp modelId="{A746EB11-4E99-4B13-AEEF-24EDCB1826B8}">
+      <dsp:nvSpPr>
+        <dsp:cNvPr id="0" name=""/>
+        <dsp:cNvSpPr/>
+      </dsp:nvSpPr>
+      <dsp:spPr>
+        <a:xfrm>
+          <a:off x="1366" y="1803466"/>
+          <a:ext cx="1811734" cy="1811734"/>
+        </a:xfrm>
+        <a:prstGeom prst="ellipse">
+          <a:avLst/>
+        </a:prstGeom>
+        <a:solidFill>
+          <a:schemeClr val="accent1">
+            <a:hueOff val="0"/>
+            <a:satOff val="0"/>
+            <a:lumOff val="0"/>
+            <a:alphaOff val="0"/>
+          </a:schemeClr>
+        </a:solidFill>
+        <a:ln w="19050" cap="rnd" cmpd="sng" algn="ctr">
+          <a:solidFill>
+            <a:schemeClr val="lt1">
+              <a:hueOff val="0"/>
+              <a:satOff val="0"/>
+              <a:lumOff val="0"/>
+              <a:alphaOff val="0"/>
+            </a:schemeClr>
+          </a:solidFill>
+          <a:prstDash val="solid"/>
+        </a:ln>
+        <a:effectLst/>
+      </dsp:spPr>
+      <dsp:style>
+        <a:lnRef idx="2">
+          <a:scrgbClr r="0" g="0" b="0"/>
+        </a:lnRef>
+        <a:fillRef idx="1">
+          <a:scrgbClr r="0" g="0" b="0"/>
+        </a:fillRef>
+        <a:effectRef idx="0">
+          <a:scrgbClr r="0" g="0" b="0"/>
+        </a:effectRef>
+        <a:fontRef idx="minor">
+          <a:schemeClr val="lt1"/>
+        </a:fontRef>
+      </dsp:style>
+      <dsp:txBody>
+        <a:bodyPr spcFirstLastPara="0" vert="horz" wrap="square" lIns="25400" tIns="25400" rIns="25400" bIns="25400" numCol="1" spcCol="1270" anchor="ctr" anchorCtr="0">
+          <a:noAutofit/>
+        </a:bodyPr>
+        <a:lstStyle/>
+        <a:p>
+          <a:pPr lvl="0" algn="ctr" defTabSz="889000">
+            <a:lnSpc>
+              <a:spcPct val="90000"/>
+            </a:lnSpc>
+            <a:spcBef>
+              <a:spcPct val="0"/>
+            </a:spcBef>
+            <a:spcAft>
+              <a:spcPct val="35000"/>
+            </a:spcAft>
+          </a:pPr>
+          <a:r>
+            <a:rPr lang="en-US" sz="2000" kern="1200" dirty="0" err="1" smtClean="0"/>
+            <a:t>OmniSharp</a:t>
+          </a:r>
+          <a:endParaRPr lang="en-US" sz="2000" kern="1200" dirty="0"/>
+        </a:p>
+      </dsp:txBody>
+      <dsp:txXfrm>
+        <a:off x="266688" y="2068788"/>
+        <a:ext cx="1281090" cy="1281090"/>
+      </dsp:txXfrm>
+    </dsp:sp>
+    <dsp:sp modelId="{99021CD3-1159-400A-919E-59EF40167229}">
+      <dsp:nvSpPr>
+        <dsp:cNvPr id="0" name=""/>
+        <dsp:cNvSpPr/>
+      </dsp:nvSpPr>
+      <dsp:spPr>
+        <a:xfrm>
+          <a:off x="1960214" y="2183930"/>
+          <a:ext cx="1050805" cy="1050805"/>
+        </a:xfrm>
+        <a:prstGeom prst="mathPlus">
+          <a:avLst/>
+        </a:prstGeom>
+        <a:solidFill>
+          <a:schemeClr val="accent1">
+            <a:tint val="60000"/>
+            <a:hueOff val="0"/>
+            <a:satOff val="0"/>
+            <a:lumOff val="0"/>
+            <a:alphaOff val="0"/>
+          </a:schemeClr>
+        </a:solidFill>
+        <a:ln>
+          <a:noFill/>
+        </a:ln>
+        <a:effectLst/>
+      </dsp:spPr>
+      <dsp:style>
+        <a:lnRef idx="0">
+          <a:scrgbClr r="0" g="0" b="0"/>
+        </a:lnRef>
+        <a:fillRef idx="1">
+          <a:scrgbClr r="0" g="0" b="0"/>
+        </a:fillRef>
+        <a:effectRef idx="0">
+          <a:scrgbClr r="0" g="0" b="0"/>
+        </a:effectRef>
+        <a:fontRef idx="minor">
+          <a:schemeClr val="lt1"/>
+        </a:fontRef>
+      </dsp:style>
+      <dsp:txBody>
+        <a:bodyPr spcFirstLastPara="0" vert="horz" wrap="square" lIns="0" tIns="0" rIns="0" bIns="0" numCol="1" spcCol="1270" anchor="ctr" anchorCtr="0">
+          <a:noAutofit/>
+        </a:bodyPr>
+        <a:lstStyle/>
+        <a:p>
+          <a:pPr lvl="0" algn="ctr" defTabSz="711200">
+            <a:lnSpc>
+              <a:spcPct val="90000"/>
+            </a:lnSpc>
+            <a:spcBef>
+              <a:spcPct val="0"/>
+            </a:spcBef>
+            <a:spcAft>
+              <a:spcPct val="35000"/>
+            </a:spcAft>
+          </a:pPr>
+          <a:endParaRPr lang="en-US" sz="1600" kern="1200"/>
+        </a:p>
+      </dsp:txBody>
+      <dsp:txXfrm>
+        <a:off x="2099498" y="2585758"/>
+        <a:ext cx="772237" cy="247149"/>
+      </dsp:txXfrm>
+    </dsp:sp>
+    <dsp:sp modelId="{2BDF25E0-CBF6-4302-B6F7-03617650C5D2}">
+      <dsp:nvSpPr>
+        <dsp:cNvPr id="0" name=""/>
+        <dsp:cNvSpPr/>
+      </dsp:nvSpPr>
+      <dsp:spPr>
+        <a:xfrm>
+          <a:off x="3158132" y="1803466"/>
+          <a:ext cx="1811734" cy="1811734"/>
+        </a:xfrm>
+        <a:prstGeom prst="ellipse">
+          <a:avLst/>
+        </a:prstGeom>
+        <a:solidFill>
+          <a:schemeClr val="accent1">
+            <a:hueOff val="0"/>
+            <a:satOff val="0"/>
+            <a:lumOff val="0"/>
+            <a:alphaOff val="0"/>
+          </a:schemeClr>
+        </a:solidFill>
+        <a:ln w="19050" cap="rnd" cmpd="sng" algn="ctr">
+          <a:solidFill>
+            <a:schemeClr val="lt1">
+              <a:hueOff val="0"/>
+              <a:satOff val="0"/>
+              <a:lumOff val="0"/>
+              <a:alphaOff val="0"/>
+            </a:schemeClr>
+          </a:solidFill>
+          <a:prstDash val="solid"/>
+        </a:ln>
+        <a:effectLst/>
+      </dsp:spPr>
+      <dsp:style>
+        <a:lnRef idx="2">
+          <a:scrgbClr r="0" g="0" b="0"/>
+        </a:lnRef>
+        <a:fillRef idx="1">
+          <a:scrgbClr r="0" g="0" b="0"/>
+        </a:fillRef>
+        <a:effectRef idx="0">
+          <a:scrgbClr r="0" g="0" b="0"/>
+        </a:effectRef>
+        <a:fontRef idx="minor">
+          <a:schemeClr val="lt1"/>
+        </a:fontRef>
+      </dsp:style>
+      <dsp:txBody>
+        <a:bodyPr spcFirstLastPara="0" vert="horz" wrap="square" lIns="25400" tIns="25400" rIns="25400" bIns="25400" numCol="1" spcCol="1270" anchor="ctr" anchorCtr="0">
+          <a:noAutofit/>
+        </a:bodyPr>
+        <a:lstStyle/>
+        <a:p>
+          <a:pPr lvl="0" algn="ctr" defTabSz="889000">
+            <a:lnSpc>
+              <a:spcPct val="90000"/>
+            </a:lnSpc>
+            <a:spcBef>
+              <a:spcPct val="0"/>
+            </a:spcBef>
+            <a:spcAft>
+              <a:spcPct val="35000"/>
+            </a:spcAft>
+          </a:pPr>
+          <a:r>
+            <a:rPr lang="en-US" sz="2000" kern="1200" dirty="0" smtClean="0"/>
+            <a:t>Yeoman</a:t>
+          </a:r>
+          <a:endParaRPr lang="en-US" sz="2000" kern="1200" dirty="0"/>
+        </a:p>
+      </dsp:txBody>
+      <dsp:txXfrm>
+        <a:off x="3423454" y="2068788"/>
+        <a:ext cx="1281090" cy="1281090"/>
+      </dsp:txXfrm>
+    </dsp:sp>
+    <dsp:sp modelId="{0CEB9DC7-5783-4ACD-BCD5-4EF3BE321E8C}">
+      <dsp:nvSpPr>
+        <dsp:cNvPr id="0" name=""/>
+        <dsp:cNvSpPr/>
+      </dsp:nvSpPr>
+      <dsp:spPr>
+        <a:xfrm>
+          <a:off x="5116980" y="2183930"/>
+          <a:ext cx="1050805" cy="1050805"/>
+        </a:xfrm>
+        <a:prstGeom prst="mathEqual">
+          <a:avLst/>
+        </a:prstGeom>
+        <a:solidFill>
+          <a:schemeClr val="accent1">
+            <a:tint val="60000"/>
+            <a:hueOff val="0"/>
+            <a:satOff val="0"/>
+            <a:lumOff val="0"/>
+            <a:alphaOff val="0"/>
+          </a:schemeClr>
+        </a:solidFill>
+        <a:ln>
+          <a:noFill/>
+        </a:ln>
+        <a:effectLst/>
+      </dsp:spPr>
+      <dsp:style>
+        <a:lnRef idx="0">
+          <a:scrgbClr r="0" g="0" b="0"/>
+        </a:lnRef>
+        <a:fillRef idx="1">
+          <a:scrgbClr r="0" g="0" b="0"/>
+        </a:fillRef>
+        <a:effectRef idx="0">
+          <a:scrgbClr r="0" g="0" b="0"/>
+        </a:effectRef>
+        <a:fontRef idx="minor">
+          <a:schemeClr val="lt1"/>
+        </a:fontRef>
+      </dsp:style>
+      <dsp:txBody>
+        <a:bodyPr spcFirstLastPara="0" vert="horz" wrap="square" lIns="0" tIns="0" rIns="0" bIns="0" numCol="1" spcCol="1270" anchor="ctr" anchorCtr="0">
+          <a:noAutofit/>
+        </a:bodyPr>
+        <a:lstStyle/>
+        <a:p>
+          <a:pPr lvl="0" algn="ctr" defTabSz="711200">
+            <a:lnSpc>
+              <a:spcPct val="90000"/>
+            </a:lnSpc>
+            <a:spcBef>
+              <a:spcPct val="0"/>
+            </a:spcBef>
+            <a:spcAft>
+              <a:spcPct val="35000"/>
+            </a:spcAft>
+          </a:pPr>
+          <a:endParaRPr lang="en-US" sz="1600" kern="1200"/>
+        </a:p>
+      </dsp:txBody>
+      <dsp:txXfrm>
+        <a:off x="5256264" y="2400396"/>
+        <a:ext cx="772237" cy="617873"/>
+      </dsp:txXfrm>
+    </dsp:sp>
+    <dsp:sp modelId="{935B9248-D5AC-4608-BFDB-4CC18A641197}">
+      <dsp:nvSpPr>
+        <dsp:cNvPr id="0" name=""/>
+        <dsp:cNvSpPr/>
+      </dsp:nvSpPr>
+      <dsp:spPr>
+        <a:xfrm>
+          <a:off x="6314898" y="1803466"/>
+          <a:ext cx="1811734" cy="1811734"/>
+        </a:xfrm>
+        <a:prstGeom prst="ellipse">
+          <a:avLst/>
+        </a:prstGeom>
+        <a:solidFill>
+          <a:schemeClr val="accent1">
+            <a:hueOff val="0"/>
+            <a:satOff val="0"/>
+            <a:lumOff val="0"/>
+            <a:alphaOff val="0"/>
+          </a:schemeClr>
+        </a:solidFill>
+        <a:ln w="19050" cap="rnd" cmpd="sng" algn="ctr">
+          <a:solidFill>
+            <a:schemeClr val="lt1">
+              <a:hueOff val="0"/>
+              <a:satOff val="0"/>
+              <a:lumOff val="0"/>
+              <a:alphaOff val="0"/>
+            </a:schemeClr>
+          </a:solidFill>
+          <a:prstDash val="solid"/>
+        </a:ln>
+        <a:effectLst/>
+      </dsp:spPr>
+      <dsp:style>
+        <a:lnRef idx="2">
+          <a:scrgbClr r="0" g="0" b="0"/>
+        </a:lnRef>
+        <a:fillRef idx="1">
+          <a:scrgbClr r="0" g="0" b="0"/>
+        </a:fillRef>
+        <a:effectRef idx="0">
+          <a:scrgbClr r="0" g="0" b="0"/>
+        </a:effectRef>
+        <a:fontRef idx="minor">
+          <a:schemeClr val="lt1"/>
+        </a:fontRef>
+      </dsp:style>
+      <dsp:txBody>
+        <a:bodyPr spcFirstLastPara="0" vert="horz" wrap="square" lIns="25400" tIns="25400" rIns="25400" bIns="25400" numCol="1" spcCol="1270" anchor="ctr" anchorCtr="0">
+          <a:noAutofit/>
+        </a:bodyPr>
+        <a:lstStyle/>
+        <a:p>
+          <a:pPr lvl="0" algn="ctr" defTabSz="889000">
+            <a:lnSpc>
+              <a:spcPct val="90000"/>
+            </a:lnSpc>
+            <a:spcBef>
+              <a:spcPct val="0"/>
+            </a:spcBef>
+            <a:spcAft>
+              <a:spcPct val="35000"/>
+            </a:spcAft>
+          </a:pPr>
+          <a:r>
+            <a:rPr lang="en-US" sz="2000" kern="1200" dirty="0" smtClean="0"/>
+            <a:t>generator-</a:t>
+          </a:r>
+          <a:r>
+            <a:rPr lang="en-US" sz="2000" kern="1200" dirty="0" err="1" smtClean="0"/>
+            <a:t>aspnet</a:t>
+          </a:r>
+          <a:endParaRPr lang="en-US" sz="2000" kern="1200" dirty="0"/>
+        </a:p>
+      </dsp:txBody>
+      <dsp:txXfrm>
+        <a:off x="6580220" y="2068788"/>
+        <a:ext cx="1281090" cy="1281090"/>
+      </dsp:txXfrm>
+    </dsp:sp>
   </dsp:spTree>
 </dsp:drawing>
 </file>
@@ -13176,7 +13543,7 @@
         </p:spPr>
       </p:pic>
       <mc:AlternateContent xmlns:mc="http://schemas.openxmlformats.org/markup-compatibility/2006">
-        <mc:Choice xmlns="" xmlns:pca="http://schemas.microsoft.com/office/powerpoint/2013/contentapp" xmlns:we="http://schemas.microsoft.com/office/webextensions/webextension/2010/11" Requires="we pca">
+        <mc:Choice xmlns:we="http://schemas.microsoft.com/office/webextensions/webextension/2010/11" xmlns:pca="http://schemas.microsoft.com/office/powerpoint/2013/contentapp" Requires="we pca">
           <p:graphicFrame>
             <p:nvGraphicFramePr>
               <p:cNvPr id="7" name="Add-in 6" title="Code Presenter Pro"/>
@@ -13186,14 +13553,14 @@
               <p:nvPr>
                 <p:extLst>
                   <p:ext uri="{D42A27DB-BD31-4B8C-83A1-F6EECF244321}">
-                    <p14:modId xmlns:p14="http://schemas.microsoft.com/office/powerpoint/2010/main" val="2971274170"/>
+                    <p14:modId xmlns:p14="http://schemas.microsoft.com/office/powerpoint/2010/main" val="3251799261"/>
                   </p:ext>
                 </p:extLst>
               </p:nvPr>
             </p:nvGraphicFramePr>
             <p:xfrm>
-              <a:off x="3505195" y="1891623"/>
-              <a:ext cx="5181600" cy="876300"/>
+              <a:off x="3505194" y="1891623"/>
+              <a:ext cx="6055889" cy="1651677"/>
             </p:xfrm>
             <a:graphic>
               <a:graphicData uri="http://schemas.microsoft.com/office/webextensions/webextension/2010/11">
@@ -13219,8 +13586,8 @@
             </p:blipFill>
             <p:spPr>
               <a:xfrm>
-                <a:off x="3505195" y="1891623"/>
-                <a:ext cx="5181600" cy="876300"/>
+                <a:off x="3505194" y="1891623"/>
+                <a:ext cx="6055889" cy="1651677"/>
               </a:xfrm>
               <a:prstGeom prst="rect">
                 <a:avLst/>
@@ -13827,8 +14194,8 @@
           </a:p>
         </p:txBody>
       </p:sp>
-      <mc:AlternateContent xmlns:mc="http://schemas.openxmlformats.org/markup-compatibility/2006">
-        <mc:Choice xmlns="" xmlns:pca="http://schemas.microsoft.com/office/powerpoint/2013/contentapp" xmlns:we="http://schemas.microsoft.com/office/webextensions/webextension/2010/11" Requires="we pca">
+      <mc:AlternateContent xmlns:mc="http://schemas.openxmlformats.org/markup-compatibility/2006" xmlns:we="http://schemas.microsoft.com/office/webextensions/webextension/2010/11" xmlns:pca="http://schemas.microsoft.com/office/powerpoint/2013/contentapp">
+        <mc:Choice Requires="we pca">
           <p:graphicFrame>
             <p:nvGraphicFramePr>
               <p:cNvPr id="5" name="Add-in 4" title="Code Presenter Pro"/>
@@ -13854,7 +14221,7 @@
             </a:graphic>
           </p:graphicFrame>
         </mc:Choice>
-        <mc:Fallback>
+        <mc:Fallback xmlns="">
           <p:pic>
             <p:nvPicPr>
               <p:cNvPr id="5" name="Add-in 4" title="Code Presenter Pro"/>
@@ -13924,7 +14291,7 @@
         </p:txBody>
       </p:sp>
       <mc:AlternateContent xmlns:mc="http://schemas.openxmlformats.org/markup-compatibility/2006">
-        <mc:Choice xmlns="" xmlns:pca="http://schemas.microsoft.com/office/powerpoint/2013/contentapp" xmlns:we="http://schemas.microsoft.com/office/webextensions/webextension/2010/11" Requires="we pca">
+        <mc:Choice xmlns:we="http://schemas.microsoft.com/office/webextensions/webextension/2010/11" xmlns:pca="http://schemas.microsoft.com/office/powerpoint/2013/contentapp" Requires="we pca">
           <p:graphicFrame>
             <p:nvGraphicFramePr>
               <p:cNvPr id="7" name="Add-in 6" title="Code Presenter Pro"/>
@@ -13934,14 +14301,14 @@
               <p:nvPr>
                 <p:extLst>
                   <p:ext uri="{D42A27DB-BD31-4B8C-83A1-F6EECF244321}">
-                    <p14:modId xmlns:p14="http://schemas.microsoft.com/office/powerpoint/2010/main" val="4190609495"/>
+                    <p14:modId xmlns:p14="http://schemas.microsoft.com/office/powerpoint/2010/main" val="3371315411"/>
                   </p:ext>
                 </p:extLst>
               </p:nvPr>
             </p:nvGraphicFramePr>
             <p:xfrm>
               <a:off x="3739811" y="1795708"/>
-              <a:ext cx="6917303" cy="1517403"/>
+              <a:ext cx="7017089" cy="1939802"/>
             </p:xfrm>
             <a:graphic>
               <a:graphicData uri="http://schemas.microsoft.com/office/webextensions/webextension/2010/11">
@@ -13968,7 +14335,7 @@
             <p:spPr>
               <a:xfrm>
                 <a:off x="3739811" y="1795708"/>
-                <a:ext cx="6917303" cy="1517403"/>
+                <a:ext cx="7017089" cy="1939802"/>
               </a:xfrm>
               <a:prstGeom prst="rect">
                 <a:avLst/>
@@ -13985,8 +14352,8 @@
         </p:nvSpPr>
         <p:spPr>
           <a:xfrm>
-            <a:off x="3739811" y="1404257"/>
-            <a:ext cx="6034425" cy="369332"/>
+            <a:off x="3739811" y="1404256"/>
+            <a:ext cx="6121475" cy="369332"/>
           </a:xfrm>
           <a:prstGeom prst="rect">
             <a:avLst/>
@@ -14275,7 +14642,7 @@
         </p:txBody>
       </p:sp>
       <mc:AlternateContent xmlns:mc="http://schemas.openxmlformats.org/markup-compatibility/2006">
-        <mc:Choice xmlns="" xmlns:pca="http://schemas.microsoft.com/office/powerpoint/2013/contentapp" xmlns:we="http://schemas.microsoft.com/office/webextensions/webextension/2010/11" Requires="we pca">
+        <mc:Choice xmlns:we="http://schemas.microsoft.com/office/webextensions/webextension/2010/11" xmlns:pca="http://schemas.microsoft.com/office/powerpoint/2013/contentapp" Requires="we pca">
           <p:graphicFrame>
             <p:nvGraphicFramePr>
               <p:cNvPr id="5" name="Add-in 4" title="Code Presenter Pro"/>
@@ -14285,14 +14652,14 @@
               <p:nvPr>
                 <p:extLst>
                   <p:ext uri="{D42A27DB-BD31-4B8C-83A1-F6EECF244321}">
-                    <p14:modId xmlns:p14="http://schemas.microsoft.com/office/powerpoint/2010/main" val="1709436076"/>
+                    <p14:modId xmlns:p14="http://schemas.microsoft.com/office/powerpoint/2010/main" val="1340843821"/>
                   </p:ext>
                 </p:extLst>
               </p:nvPr>
             </p:nvGraphicFramePr>
             <p:xfrm>
               <a:off x="3904489" y="1980405"/>
-              <a:ext cx="2831591" cy="2076465"/>
+              <a:ext cx="5148677" cy="2408687"/>
             </p:xfrm>
             <a:graphic>
               <a:graphicData uri="http://schemas.microsoft.com/office/webextensions/webextension/2010/11">
@@ -14319,7 +14686,7 @@
             <p:spPr>
               <a:xfrm>
                 <a:off x="3904489" y="1980405"/>
-                <a:ext cx="2831591" cy="2076465"/>
+                <a:ext cx="5148677" cy="2408687"/>
               </a:xfrm>
               <a:prstGeom prst="rect">
                 <a:avLst/>
@@ -14379,7 +14746,7 @@
         <p:spPr>
           <a:xfrm>
             <a:off x="3904489" y="1527839"/>
-            <a:ext cx="2831591" cy="369332"/>
+            <a:ext cx="3772158" cy="369332"/>
           </a:xfrm>
           <a:prstGeom prst="rect">
             <a:avLst/>
@@ -14408,7 +14775,7 @@
         </p:nvSpPr>
         <p:spPr>
           <a:xfrm rot="19188924">
-            <a:off x="2488953" y="3432975"/>
+            <a:off x="2516947" y="3801424"/>
             <a:ext cx="1162744" cy="510891"/>
           </a:xfrm>
           <a:prstGeom prst="leftArrow">
@@ -14458,7 +14825,7 @@
         </p:blipFill>
         <p:spPr>
           <a:xfrm>
-            <a:off x="230330" y="4152612"/>
+            <a:off x="283708" y="4536802"/>
             <a:ext cx="6672024" cy="1358900"/>
           </a:xfrm>
           <a:prstGeom prst="rect">
@@ -14482,7 +14849,7 @@
         </p:blipFill>
         <p:spPr>
           <a:xfrm>
-            <a:off x="7898222" y="3588357"/>
+            <a:off x="7841458" y="4389092"/>
             <a:ext cx="4260716" cy="2317143"/>
           </a:xfrm>
           <a:prstGeom prst="rect">
@@ -16778,11 +17145,7 @@
             </a:r>
             <a:r>
               <a:rPr lang="en-US" dirty="0" smtClean="0"/>
-              <a:t>Utility</a:t>
-            </a:r>
-            <a:r>
-              <a:rPr lang="en-US" dirty="0" smtClean="0"/>
-              <a:t>)</a:t>
+              <a:t>Utility)</a:t>
             </a:r>
           </a:p>
           <a:p>
@@ -18268,7 +18631,7 @@
   <a:extraClrSchemeLst/>
   <a:extLst>
     <a:ext uri="{05A4C25C-085E-4340-85A3-A5531E510DB2}">
-      <thm15:themeFamily xmlns="" xmlns:thm15="http://schemas.microsoft.com/office/thememl/2012/main" name="Facet" id="{C0C680CD-088A-49FC-A102-D699147F32B2}" vid="{0B5AB586-D108-4FC1-8368-649FE654B894}"/>
+      <thm15:themeFamily xmlns:thm15="http://schemas.microsoft.com/office/thememl/2012/main" name="Facet" id="{C0C680CD-088A-49FC-A102-D699147F32B2}" vid="{0B5AB586-D108-4FC1-8368-649FE654B894}"/>
     </a:ext>
   </a:extLst>
 </a:theme>
@@ -18529,7 +18892,7 @@
   <a:extraClrSchemeLst/>
   <a:extLst>
     <a:ext uri="{05A4C25C-085E-4340-85A3-A5531E510DB2}">
-      <thm15:themeFamily xmlns="" xmlns:thm15="http://schemas.microsoft.com/office/thememl/2012/main" name="Office Theme" id="{62F939B6-93AF-4DB8-9C6B-D6C7DFDC589F}" vid="{4A3C46E8-61CC-4603-A589-7422A47A8E4A}"/>
+      <thm15:themeFamily xmlns:thm15="http://schemas.microsoft.com/office/thememl/2012/main" name="Office Theme" id="{62F939B6-93AF-4DB8-9C6B-D6C7DFDC589F}" vid="{4A3C46E8-61CC-4603-A589-7422A47A8E4A}"/>
     </a:ext>
   </a:extLst>
 </a:theme>

</xml_diff>